<commit_message>
Updated to include my edits
</commit_message>
<xml_diff>
--- a/opends4all-resources/opends4all-scalable-data-processing/GRAPHS-adjacency-matrices.pptx
+++ b/opends4all-resources/opends4all-scalable-data-processing/GRAPHS-adjacency-matrices.pptx
@@ -632,10 +632,10 @@
           </a:ln>
           <a:extLst>
             <a:ext uri="{FAA26D3D-D897-4be2-8F04-BA451C77F1D7}">
-              <ma14:placeholderFlag xmlns:ma14="http://schemas.microsoft.com/office/mac/drawingml/2011/main" xmlns="" val="1"/>
+              <ma14:placeholderFlag xmlns="" xmlns:ma14="http://schemas.microsoft.com/office/mac/drawingml/2011/main" val="1"/>
             </a:ext>
             <a:ext uri="{909E8E84-426E-40dd-AFC4-6F175D3DCCD1}">
-              <a14:hiddenFill xmlns="" xmlns:a14="http://schemas.microsoft.com/office/drawing/2010/main">
+              <a14:hiddenFill xmlns:a14="http://schemas.microsoft.com/office/drawing/2010/main" xmlns="">
                 <a:solidFill>
                   <a:srgbClr val="FFFFFF"/>
                 </a:solidFill>
@@ -998,14 +998,14 @@
           <a:ln/>
           <a:extLst>
             <a:ext uri="{909E8E84-426E-40dd-AFC4-6F175D3DCCD1}">
-              <a14:hiddenFill xmlns:a14="http://schemas.microsoft.com/office/drawing/2010/main" xmlns="">
+              <a14:hiddenFill xmlns="" xmlns:a14="http://schemas.microsoft.com/office/drawing/2010/main">
                 <a:solidFill>
                   <a:srgbClr val="FFFFFF"/>
                 </a:solidFill>
               </a14:hiddenFill>
             </a:ext>
             <a:ext uri="{91240B29-F687-4f45-9708-019B960494DF}">
-              <a14:hiddenLine xmlns:a14="http://schemas.microsoft.com/office/drawing/2010/main" xmlns="" w="9525">
+              <a14:hiddenLine xmlns="" xmlns:a14="http://schemas.microsoft.com/office/drawing/2010/main" w="9525">
                 <a:solidFill>
                   <a:srgbClr val="000000"/>
                 </a:solidFill>
@@ -1236,17 +1236,17 @@
           <a:ln/>
           <a:extLst>
             <a:ext uri="{FAA26D3D-D897-4be2-8F04-BA451C77F1D7}">
-              <ma14:placeholderFlag xmlns="" xmlns:ma14="http://schemas.microsoft.com/office/mac/drawingml/2011/main" val="1"/>
+              <ma14:placeholderFlag xmlns:ma14="http://schemas.microsoft.com/office/mac/drawingml/2011/main" xmlns="" val="1"/>
             </a:ext>
             <a:ext uri="{909E8E84-426E-40dd-AFC4-6F175D3DCCD1}">
-              <a14:hiddenFill xmlns:a14="http://schemas.microsoft.com/office/drawing/2010/main" xmlns="">
+              <a14:hiddenFill xmlns="" xmlns:a14="http://schemas.microsoft.com/office/drawing/2010/main">
                 <a:solidFill>
                   <a:srgbClr val="FFFFFF"/>
                 </a:solidFill>
               </a14:hiddenFill>
             </a:ext>
             <a:ext uri="{91240B29-F687-4f45-9708-019B960494DF}">
-              <a14:hiddenLine xmlns:a14="http://schemas.microsoft.com/office/drawing/2010/main" xmlns="" w="9525">
+              <a14:hiddenLine xmlns="" xmlns:a14="http://schemas.microsoft.com/office/drawing/2010/main" w="9525">
                 <a:solidFill>
                   <a:srgbClr val="000000"/>
                 </a:solidFill>
@@ -1321,7 +1321,7 @@
           <a:p>
             <a:r>
               <a:rPr lang="en-US" dirty="0"/>
-              <a:t>Can create self loops.</a:t>
+              <a:t>After running for multiple iterations, the page with the self-loop (M) “absorbs” all the PageRank credit.</a:t>
             </a:r>
           </a:p>
         </p:txBody>
@@ -1414,7 +1414,7 @@
           <a:p>
             <a:r>
               <a:rPr lang="en-US" dirty="0"/>
-              <a:t>Can create self loops.</a:t>
+              <a:t>This is because PageRank can never “flow out” of M, and so it accumulates.</a:t>
             </a:r>
           </a:p>
         </p:txBody>
@@ -1507,7 +1507,13 @@
           <a:p>
             <a:r>
               <a:rPr lang="en-US" dirty="0"/>
-              <a:t>Add a factor to uniformly, randomly jump to another page. </a:t>
+              <a:t>To avoid the problem of dead-ends (pages with no outgoing links), we can either remove them or add back-edges for these nodes, i.e. edges going the reverse direction of incoming edges.</a:t>
+            </a:r>
+          </a:p>
+          <a:p>
+            <a:r>
+              <a:rPr lang="en-US" dirty="0"/>
+              <a:t>Alternatively we can add a damping or decay factor to deal with sinks, which also helps deal with rank hogs.</a:t>
             </a:r>
           </a:p>
         </p:txBody>
@@ -1545,6 +1551,217 @@
     <p:extLst>
       <p:ext uri="{BB962C8B-B14F-4D97-AF65-F5344CB8AC3E}">
         <p14:creationId xmlns:p14="http://schemas.microsoft.com/office/powerpoint/2010/main" val="44305016"/>
+      </p:ext>
+    </p:extLst>
+  </p:cSld>
+  <p:clrMapOvr>
+    <a:masterClrMapping/>
+  </p:clrMapOvr>
+</p:notes>
+</file>
+
+<file path=ppt/notesSlides/notesSlide13.xml><?xml version="1.0" encoding="utf-8"?>
+<p:notes xmlns:a="http://schemas.openxmlformats.org/drawingml/2006/main" xmlns:r="http://schemas.openxmlformats.org/officeDocument/2006/relationships" xmlns:p="http://schemas.openxmlformats.org/presentationml/2006/main">
+  <p:cSld>
+    <p:spTree>
+      <p:nvGrpSpPr>
+        <p:cNvPr id="1" name=""/>
+        <p:cNvGrpSpPr/>
+        <p:nvPr/>
+      </p:nvGrpSpPr>
+      <p:grpSpPr>
+        <a:xfrm>
+          <a:off x="0" y="0"/>
+          <a:ext cx="0" cy="0"/>
+          <a:chOff x="0" y="0"/>
+          <a:chExt cx="0" cy="0"/>
+        </a:xfrm>
+      </p:grpSpPr>
+      <p:sp>
+        <p:nvSpPr>
+          <p:cNvPr id="2" name="Slide Image Placeholder 1"/>
+          <p:cNvSpPr>
+            <a:spLocks noGrp="1" noRot="1" noChangeAspect="1"/>
+          </p:cNvSpPr>
+          <p:nvPr>
+            <p:ph type="sldImg"/>
+          </p:nvPr>
+        </p:nvSpPr>
+        <p:spPr/>
+      </p:sp>
+      <p:sp>
+        <p:nvSpPr>
+          <p:cNvPr id="3" name="Notes Placeholder 2"/>
+          <p:cNvSpPr>
+            <a:spLocks noGrp="1"/>
+          </p:cNvSpPr>
+          <p:nvPr>
+            <p:ph type="body" idx="1"/>
+          </p:nvPr>
+        </p:nvSpPr>
+        <p:spPr/>
+        <p:txBody>
+          <a:bodyPr/>
+          <a:lstStyle/>
+          <a:p>
+            <a:pPr marL="0" marR="0" lvl="0" indent="0" algn="l" defTabSz="914400" rtl="0" eaLnBrk="0" fontAlgn="base" latinLnBrk="0" hangingPunct="0">
+              <a:lnSpc>
+                <a:spcPct val="100000"/>
+              </a:lnSpc>
+              <a:spcBef>
+                <a:spcPct val="30000"/>
+              </a:spcBef>
+              <a:spcAft>
+                <a:spcPct val="0"/>
+              </a:spcAft>
+              <a:buClrTx/>
+              <a:buSzTx/>
+              <a:buFontTx/>
+              <a:buNone/>
+              <a:tabLst/>
+              <a:defRPr/>
+            </a:pPr>
+            <a:r>
+              <a:rPr lang="en-US" dirty="0"/>
+              <a:t>Returning to the example using alpha and beta, we again run for multiple iterations.</a:t>
+            </a:r>
+          </a:p>
+          <a:p>
+            <a:endParaRPr lang="en-US" dirty="0"/>
+          </a:p>
+        </p:txBody>
+      </p:sp>
+      <p:sp>
+        <p:nvSpPr>
+          <p:cNvPr id="4" name="Slide Number Placeholder 3"/>
+          <p:cNvSpPr>
+            <a:spLocks noGrp="1"/>
+          </p:cNvSpPr>
+          <p:nvPr>
+            <p:ph type="sldNum" sz="quarter" idx="5"/>
+          </p:nvPr>
+        </p:nvSpPr>
+        <p:spPr/>
+        <p:txBody>
+          <a:bodyPr/>
+          <a:lstStyle/>
+          <a:p>
+            <a:pPr>
+              <a:defRPr/>
+            </a:pPr>
+            <a:fld id="{45412121-731D-1546-9AB4-9CB6A8CF8847}" type="slidenum">
+              <a:rPr lang="en-US" smtClean="0"/>
+              <a:pPr>
+                <a:defRPr/>
+              </a:pPr>
+              <a:t>16</a:t>
+            </a:fld>
+            <a:endParaRPr lang="en-US"/>
+          </a:p>
+        </p:txBody>
+      </p:sp>
+    </p:spTree>
+    <p:extLst>
+      <p:ext uri="{BB962C8B-B14F-4D97-AF65-F5344CB8AC3E}">
+        <p14:creationId xmlns:p14="http://schemas.microsoft.com/office/powerpoint/2010/main" val="2067110116"/>
+      </p:ext>
+    </p:extLst>
+  </p:cSld>
+  <p:clrMapOvr>
+    <a:masterClrMapping/>
+  </p:clrMapOvr>
+</p:notes>
+</file>
+
+<file path=ppt/notesSlides/notesSlide14.xml><?xml version="1.0" encoding="utf-8"?>
+<p:notes xmlns:a="http://schemas.openxmlformats.org/drawingml/2006/main" xmlns:r="http://schemas.openxmlformats.org/officeDocument/2006/relationships" xmlns:p="http://schemas.openxmlformats.org/presentationml/2006/main">
+  <p:cSld>
+    <p:spTree>
+      <p:nvGrpSpPr>
+        <p:cNvPr id="1" name=""/>
+        <p:cNvGrpSpPr/>
+        <p:nvPr/>
+      </p:nvGrpSpPr>
+      <p:grpSpPr>
+        <a:xfrm>
+          <a:off x="0" y="0"/>
+          <a:ext cx="0" cy="0"/>
+          <a:chOff x="0" y="0"/>
+          <a:chExt cx="0" cy="0"/>
+        </a:xfrm>
+      </p:grpSpPr>
+      <p:sp>
+        <p:nvSpPr>
+          <p:cNvPr id="2" name="Slide Image Placeholder 1"/>
+          <p:cNvSpPr>
+            <a:spLocks noGrp="1" noRot="1" noChangeAspect="1"/>
+          </p:cNvSpPr>
+          <p:nvPr>
+            <p:ph type="sldImg"/>
+          </p:nvPr>
+        </p:nvSpPr>
+        <p:spPr/>
+      </p:sp>
+      <p:sp>
+        <p:nvSpPr>
+          <p:cNvPr id="3" name="Notes Placeholder 2"/>
+          <p:cNvSpPr>
+            <a:spLocks noGrp="1"/>
+          </p:cNvSpPr>
+          <p:nvPr>
+            <p:ph type="body" idx="1"/>
+          </p:nvPr>
+        </p:nvSpPr>
+        <p:spPr/>
+        <p:txBody>
+          <a:bodyPr/>
+          <a:lstStyle/>
+          <a:p>
+            <a:r>
+              <a:rPr lang="en-US" dirty="0"/>
+              <a:t>Now converging to something where M no longer absorbs all the </a:t>
+            </a:r>
+            <a:r>
+              <a:rPr lang="en-US" dirty="0" err="1"/>
+              <a:t>Pagerank</a:t>
+            </a:r>
+            <a:endParaRPr lang="en-US" dirty="0"/>
+          </a:p>
+        </p:txBody>
+      </p:sp>
+      <p:sp>
+        <p:nvSpPr>
+          <p:cNvPr id="4" name="Slide Number Placeholder 3"/>
+          <p:cNvSpPr>
+            <a:spLocks noGrp="1"/>
+          </p:cNvSpPr>
+          <p:nvPr>
+            <p:ph type="sldNum" sz="quarter" idx="5"/>
+          </p:nvPr>
+        </p:nvSpPr>
+        <p:spPr/>
+        <p:txBody>
+          <a:bodyPr/>
+          <a:lstStyle/>
+          <a:p>
+            <a:pPr>
+              <a:defRPr/>
+            </a:pPr>
+            <a:fld id="{45412121-731D-1546-9AB4-9CB6A8CF8847}" type="slidenum">
+              <a:rPr lang="en-US" smtClean="0"/>
+              <a:pPr>
+                <a:defRPr/>
+              </a:pPr>
+              <a:t>17</a:t>
+            </a:fld>
+            <a:endParaRPr lang="en-US"/>
+          </a:p>
+        </p:txBody>
+      </p:sp>
+    </p:spTree>
+    <p:extLst>
+      <p:ext uri="{BB962C8B-B14F-4D97-AF65-F5344CB8AC3E}">
+        <p14:creationId xmlns:p14="http://schemas.microsoft.com/office/powerpoint/2010/main" val="3724526149"/>
       </p:ext>
     </p:extLst>
   </p:cSld>
@@ -2069,6 +2286,29 @@
           <a:bodyPr/>
           <a:lstStyle/>
           <a:p>
+            <a:pPr marL="0" marR="0" lvl="0" indent="0" algn="l" defTabSz="914400" rtl="0" eaLnBrk="0" fontAlgn="base" latinLnBrk="0" hangingPunct="0">
+              <a:lnSpc>
+                <a:spcPct val="100000"/>
+              </a:lnSpc>
+              <a:spcBef>
+                <a:spcPct val="30000"/>
+              </a:spcBef>
+              <a:spcAft>
+                <a:spcPct val="0"/>
+              </a:spcAft>
+              <a:buClrTx/>
+              <a:buSzTx/>
+              <a:buFontTx/>
+              <a:buNone/>
+              <a:tabLst/>
+              <a:defRPr/>
+            </a:pPr>
+            <a:r>
+              <a:rPr lang="en-US" dirty="0"/>
+              <a:t>When we run this, after a few iterations everything goes to 0.</a:t>
+            </a:r>
+          </a:p>
+          <a:p>
             <a:endParaRPr lang="en-US" dirty="0"/>
           </a:p>
         </p:txBody>
@@ -2161,7 +2401,7 @@
           <a:p>
             <a:r>
               <a:rPr lang="en-US" dirty="0"/>
-              <a:t>We shouldn’t lose the total PageRank that we started with (3).</a:t>
+              <a:t>We shouldn’t lose the total PageRank that we started with (3). It is getting absorbed in the ”dead end” of M.</a:t>
             </a:r>
           </a:p>
         </p:txBody>
@@ -2254,7 +2494,7 @@
           <a:p>
             <a:r>
               <a:rPr lang="en-US" dirty="0"/>
-              <a:t>Can create self loops.</a:t>
+              <a:t>Another problem is when there are self loops.</a:t>
             </a:r>
           </a:p>
         </p:txBody>
@@ -2793,7 +3033,7 @@
             </a:pPr>
             <a:fld id="{3EC3B583-5CD6-D948-BDAB-85E48E211A61}" type="datetime1">
               <a:rPr lang="en-US" smtClean="0"/>
-              <a:t>11/27/2019</a:t>
+              <a:t>2/21/20</a:t>
             </a:fld>
             <a:endParaRPr lang="en-US" dirty="0"/>
           </a:p>
@@ -3134,7 +3374,7 @@
             </a:pPr>
             <a:fld id="{EDA10BB1-5FEF-5D49-A5E8-7A0C4CCDF4F5}" type="datetime1">
               <a:rPr lang="en-US" smtClean="0"/>
-              <a:t>11/27/2019</a:t>
+              <a:t>2/21/20</a:t>
             </a:fld>
             <a:endParaRPr lang="en-US" dirty="0"/>
           </a:p>
@@ -3775,7 +4015,7 @@
             </a:pPr>
             <a:fld id="{39870745-EE23-D54C-BC4E-FFEBC40C1B7F}" type="datetime1">
               <a:rPr lang="en-US" smtClean="0"/>
-              <a:t>11/27/2019</a:t>
+              <a:t>2/21/20</a:t>
             </a:fld>
             <a:endParaRPr lang="en-US"/>
           </a:p>
@@ -4116,7 +4356,7 @@
             </a:pPr>
             <a:fld id="{67213E9C-FF14-4643-83ED-B69CDAB453BF}" type="datetime1">
               <a:rPr lang="en-US" smtClean="0"/>
-              <a:t>11/27/2019</a:t>
+              <a:t>2/21/20</a:t>
             </a:fld>
             <a:endParaRPr lang="en-US" dirty="0"/>
           </a:p>
@@ -4744,7 +4984,7 @@
             </a:pPr>
             <a:fld id="{F9F9A853-1103-7247-9B77-965B90EE6D8E}" type="datetime1">
               <a:rPr lang="en-US" smtClean="0"/>
-              <a:t>11/27/2019</a:t>
+              <a:t>2/21/20</a:t>
             </a:fld>
             <a:endParaRPr lang="en-US"/>
           </a:p>
@@ -5129,7 +5369,7 @@
             </a:pPr>
             <a:fld id="{5F8EEEC3-67C0-2749-9296-FAA0346EEEE3}" type="datetime1">
               <a:rPr lang="en-US" smtClean="0"/>
-              <a:t>11/27/2019</a:t>
+              <a:t>2/21/20</a:t>
             </a:fld>
             <a:endParaRPr lang="en-US" dirty="0"/>
           </a:p>
@@ -5396,7 +5636,7 @@
             </a:pPr>
             <a:fld id="{B1CA23EC-4DEF-9149-8D08-AF5E17508753}" type="datetime1">
               <a:rPr lang="en-US" smtClean="0"/>
-              <a:t>11/27/2019</a:t>
+              <a:t>2/21/20</a:t>
             </a:fld>
             <a:endParaRPr lang="en-US" dirty="0"/>
           </a:p>
@@ -5669,7 +5909,7 @@
             </a:pPr>
             <a:fld id="{E2770287-97C7-0B4A-89AA-9C9EE7BEF919}" type="datetime1">
               <a:rPr lang="en-US" smtClean="0"/>
-              <a:t>11/27/2019</a:t>
+              <a:t>2/21/20</a:t>
             </a:fld>
             <a:endParaRPr lang="en-US" dirty="0"/>
           </a:p>
@@ -6706,7 +6946,7 @@
             </a:pPr>
             <a:fld id="{E551CE7D-B5D7-5745-8C89-C9AB849DC130}" type="datetime1">
               <a:rPr lang="en-US" smtClean="0"/>
-              <a:t>11/27/2019</a:t>
+              <a:t>2/21/20</a:t>
             </a:fld>
             <a:endParaRPr lang="en-US"/>
           </a:p>
@@ -7055,7 +7295,7 @@
             </a:pPr>
             <a:fld id="{8FBD591B-9D13-B949-9C7D-34F44F1D5FA5}" type="datetime1">
               <a:rPr lang="en-US" smtClean="0"/>
-              <a:t>11/27/2019</a:t>
+              <a:t>2/21/20</a:t>
             </a:fld>
             <a:endParaRPr lang="en-US" dirty="0"/>
           </a:p>
@@ -7450,7 +7690,7 @@
             </a:pPr>
             <a:fld id="{7698F29D-462E-7342-BA78-DA612F4BACDB}" type="datetime1">
               <a:rPr lang="en-US" smtClean="0"/>
-              <a:t>11/27/2019</a:t>
+              <a:t>2/21/20</a:t>
             </a:fld>
             <a:endParaRPr lang="en-US"/>
           </a:p>
@@ -7995,7 +8235,7 @@
             </a:pPr>
             <a:fld id="{A753903F-777F-8B4D-8568-B9E93A6194EB}" type="datetime1">
               <a:rPr lang="en-US" smtClean="0"/>
-              <a:t>11/27/2019</a:t>
+              <a:t>2/21/20</a:t>
             </a:fld>
             <a:endParaRPr lang="en-US" dirty="0"/>
           </a:p>
@@ -8206,7 +8446,7 @@
             </a:pPr>
             <a:fld id="{98721A9B-B6D4-3D45-A9ED-A90EF0C241CB}" type="datetime1">
               <a:rPr lang="en-US" smtClean="0"/>
-              <a:t>11/27/2019</a:t>
+              <a:t>2/21/20</a:t>
             </a:fld>
             <a:endParaRPr lang="en-US" dirty="0"/>
           </a:p>
@@ -8394,7 +8634,7 @@
             </a:pPr>
             <a:fld id="{D8FEF782-0C1E-1147-BDBC-60AA537F4082}" type="datetime1">
               <a:rPr lang="en-US" smtClean="0"/>
-              <a:t>11/27/2019</a:t>
+              <a:t>2/21/20</a:t>
             </a:fld>
             <a:endParaRPr lang="en-US"/>
           </a:p>
@@ -8770,7 +9010,7 @@
             </a:pPr>
             <a:fld id="{6AD18EFD-F73B-B24F-8869-B6F434543551}" type="datetime1">
               <a:rPr lang="en-US" smtClean="0"/>
-              <a:t>11/27/2019</a:t>
+              <a:t>2/21/20</a:t>
             </a:fld>
             <a:endParaRPr lang="en-US" dirty="0"/>
           </a:p>
@@ -9155,7 +9395,7 @@
             </a:pPr>
             <a:fld id="{F86D5DE9-9BBC-5948-BCD4-460FDA513281}" type="datetime1">
               <a:rPr lang="en-US" smtClean="0"/>
-              <a:t>11/27/2019</a:t>
+              <a:t>2/21/20</a:t>
             </a:fld>
             <a:endParaRPr lang="en-US" dirty="0"/>
           </a:p>
@@ -9348,17 +9588,17 @@
           </a:ln>
           <a:extLst>
             <a:ext uri="{FAA26D3D-D897-4be2-8F04-BA451C77F1D7}">
-              <ma14:placeholderFlag xmlns:ma14="http://schemas.microsoft.com/office/mac/drawingml/2011/main" xmlns="" val="1"/>
+              <ma14:placeholderFlag xmlns="" xmlns:ma14="http://schemas.microsoft.com/office/mac/drawingml/2011/main" val="1"/>
             </a:ext>
             <a:ext uri="{909E8E84-426E-40dd-AFC4-6F175D3DCCD1}">
-              <a14:hiddenFill xmlns="" xmlns:a14="http://schemas.microsoft.com/office/drawing/2010/main">
+              <a14:hiddenFill xmlns:a14="http://schemas.microsoft.com/office/drawing/2010/main" xmlns="">
                 <a:solidFill>
                   <a:srgbClr val="FFFFFF"/>
                 </a:solidFill>
               </a14:hiddenFill>
             </a:ext>
             <a:ext uri="{91240B29-F687-4f45-9708-019B960494DF}">
-              <a14:hiddenLine xmlns="" xmlns:a14="http://schemas.microsoft.com/office/drawing/2010/main" w="9525">
+              <a14:hiddenLine xmlns:a14="http://schemas.microsoft.com/office/drawing/2010/main" xmlns="" w="9525">
                 <a:solidFill>
                   <a:srgbClr val="000000"/>
                 </a:solidFill>
@@ -9409,17 +9649,17 @@
           </a:ln>
           <a:extLst>
             <a:ext uri="{FAA26D3D-D897-4be2-8F04-BA451C77F1D7}">
-              <ma14:placeholderFlag xmlns:ma14="http://schemas.microsoft.com/office/mac/drawingml/2011/main" xmlns="" val="1"/>
+              <ma14:placeholderFlag xmlns="" xmlns:ma14="http://schemas.microsoft.com/office/mac/drawingml/2011/main" val="1"/>
             </a:ext>
             <a:ext uri="{909E8E84-426E-40dd-AFC4-6F175D3DCCD1}">
-              <a14:hiddenFill xmlns="" xmlns:a14="http://schemas.microsoft.com/office/drawing/2010/main">
+              <a14:hiddenFill xmlns:a14="http://schemas.microsoft.com/office/drawing/2010/main" xmlns="">
                 <a:solidFill>
                   <a:srgbClr val="FFFFFF"/>
                 </a:solidFill>
               </a14:hiddenFill>
             </a:ext>
             <a:ext uri="{91240B29-F687-4f45-9708-019B960494DF}">
-              <a14:hiddenLine xmlns="" xmlns:a14="http://schemas.microsoft.com/office/drawing/2010/main" w="9525">
+              <a14:hiddenLine xmlns:a14="http://schemas.microsoft.com/office/drawing/2010/main" xmlns="" w="9525">
                 <a:solidFill>
                   <a:srgbClr val="000000"/>
                 </a:solidFill>
@@ -9521,7 +9761,7 @@
             </a:pPr>
             <a:fld id="{7323C85F-1269-B54F-84D5-B0E2FBC7E66E}" type="datetime1">
               <a:rPr lang="en-US" smtClean="0"/>
-              <a:t>11/27/2019</a:t>
+              <a:t>2/21/20</a:t>
             </a:fld>
             <a:endParaRPr lang="en-US"/>
           </a:p>
@@ -28590,7 +28830,7 @@
                 <a:avLst/>
               </a:prstGeom>
               <a:blipFill rotWithShape="0">
-                <a:blip r:embed="rId2"/>
+                <a:blip r:embed="rId3"/>
                 <a:stretch>
                   <a:fillRect/>
                 </a:stretch>
@@ -28680,7 +28920,7 @@
                 <a:avLst/>
               </a:prstGeom>
               <a:blipFill rotWithShape="0">
-                <a:blip r:embed="rId3"/>
+                <a:blip r:embed="rId4"/>
                 <a:stretch>
                   <a:fillRect l="-5714" b="-16667"/>
                 </a:stretch>
@@ -31006,45 +31246,6 @@
                 <a:latin typeface="Gill Sans MT" pitchFamily="34" charset="0"/>
               </a:rPr>
               <a:t>Running for multiple iterations:</a:t>
-            </a:r>
-          </a:p>
-        </p:txBody>
-      </p:sp>
-      <p:sp>
-        <p:nvSpPr>
-          <p:cNvPr id="30772" name="Text Box 110"/>
-          <p:cNvSpPr txBox="1">
-            <a:spLocks noChangeArrowheads="1"/>
-          </p:cNvSpPr>
-          <p:nvPr/>
-        </p:nvSpPr>
-        <p:spPr bwMode="auto">
-          <a:xfrm>
-            <a:off x="4629950" y="4850607"/>
-            <a:ext cx="2485617" cy="323165"/>
-          </a:xfrm>
-          <a:prstGeom prst="rect">
-            <a:avLst/>
-          </a:prstGeom>
-          <a:noFill/>
-          <a:ln w="9525">
-            <a:noFill/>
-            <a:miter lim="800000"/>
-            <a:headEnd/>
-            <a:tailEnd/>
-          </a:ln>
-        </p:spPr>
-        <p:txBody>
-          <a:bodyPr wrap="none">
-            <a:spAutoFit/>
-          </a:bodyPr>
-          <a:lstStyle/>
-          <a:p>
-            <a:r>
-              <a:rPr lang="en-US" sz="1500" i="1">
-                <a:latin typeface="Gill Sans MT" pitchFamily="34" charset="0"/>
-              </a:rPr>
-              <a:t>… though does this seem right?</a:t>
             </a:r>
           </a:p>
         </p:txBody>
@@ -32534,7 +32735,7 @@
                 <a:avLst/>
               </a:prstGeom>
               <a:blipFill rotWithShape="0">
-                <a:blip r:embed="rId2"/>
+                <a:blip r:embed="rId3"/>
                 <a:stretch>
                   <a:fillRect/>
                 </a:stretch>
@@ -32624,7 +32825,7 @@
                 <a:avLst/>
               </a:prstGeom>
               <a:blipFill rotWithShape="0">
-                <a:blip r:embed="rId3"/>
+                <a:blip r:embed="rId4"/>
                 <a:stretch>
                   <a:fillRect l="-5714" b="-16667"/>
                 </a:stretch>
@@ -34985,7 +35186,7 @@
           <a:graphicData uri="http://schemas.openxmlformats.org/presentationml/2006/ole">
             <mc:AlternateContent xmlns:mc="http://schemas.openxmlformats.org/markup-compatibility/2006">
               <mc:Choice xmlns:v="urn:schemas-microsoft-com:vml" Requires="v">
-                <p:oleObj spid="_x0000_s7176" name="Equation" r:id="rId3" imgW="2527200" imgH="939600" progId="Equation.3">
+                <p:oleObj spid="_x0000_s7177" name="Equation" r:id="rId3" imgW="2527200" imgH="939600" progId="Equation.3">
                   <p:embed/>
                 </p:oleObj>
               </mc:Choice>
@@ -35533,7 +35734,7 @@
           <a:graphicData uri="http://schemas.openxmlformats.org/presentationml/2006/ole">
             <mc:AlternateContent xmlns:mc="http://schemas.openxmlformats.org/markup-compatibility/2006">
               <mc:Choice xmlns:v="urn:schemas-microsoft-com:vml" Requires="v">
-                <p:oleObj spid="_x0000_s8200" name="Equation" r:id="rId3" imgW="2527200" imgH="939600" progId="Equation.3">
+                <p:oleObj spid="_x0000_s8201" name="Equation" r:id="rId3" imgW="2527200" imgH="939600" progId="Equation.3">
                   <p:embed/>
                 </p:oleObj>
               </mc:Choice>

</xml_diff>